<commit_message>
Error handling, logging with log4j
</commit_message>
<xml_diff>
--- a/test.pptx
+++ b/test.pptx
@@ -3136,7 +3136,7 @@
                   <a:srgbClr val="FFFFFF"/>
                 </a:solidFill>
               </a:rPr>
-              <a:t>1. Tebenned bíztunk eleitől fogva, / Uram, téged tartottunk hajlékunknak! / Mikor még semmi hegyek nem voltanak, / Hogy még sem ég, sem föld nem volt formálva, / Te voltál, és te vagy, erős Isten, / És te megmaradsz minden időben.
+              <a:t>4. Midőn, Uram, haragodban versz minket, / Ottan meghalunk, és földre leesünk, / A te kemény haragodtól rettegünk, / Ha megtekinted mi nagy bűneinket, / Titkos vétkünket ha előhozod, / És színed eleibe állítod.
 </a:t>
             </a:r>
           </a:p>
@@ -3147,7 +3147,7 @@
                   <a:srgbClr val="FFFFFF"/>
                 </a:solidFill>
               </a:rPr>
-              <a:t>2. Az embereket te meg hagyod halni, / És ezt mondod az emberi nemzetnek: / Légyetek porrá, kik porból lettetek! / Mert ezer esztendő előtted annyi, / Mint a tegnapnak ő elmúlása / És egy éjnek rövid vigyázása.
+              <a:t>5. Haragod miatt napja életünknek / Menten elmúlik nagy hirtelenséggel, / Mint a mondott szót elragadja a szél. / Mi napjaink, miket nekünk engedtek, / Mintegy hetvenesztendei idő, / Hogyha több, tehát nyolcvan esztendő.
 </a:t>
             </a:r>
           </a:p>
@@ -3213,7 +3213,7 @@
                   <a:srgbClr val="FFFFFF"/>
                 </a:solidFill>
               </a:rPr>
-              <a:t>3. Elmúlni hagyod őket oly hirtelen, / Mint az álom, mely eltűnik azontól, / Mihelyt az ember felserken álmából, / És mint a zöld füvecske a mezőben, / Amely nagy hamarsággal elhervad, / Reggel virágzik, este megszárad.
+              <a:t>6. És ha kedves volt is valamennyire, / De többnyire volt munka és fájdalom; / Eltűnik éltünk minden ékessége, / Elmúlik, mint az árnyék és az álom. / De ki érti a te haragodat? / Csak az, ki féli te hatalmadat.
 </a:t>
             </a:r>
           </a:p>
@@ -3224,7 +3224,7 @@
                   <a:srgbClr val="FFFFFF"/>
                 </a:solidFill>
               </a:rPr>
-              <a:t>4. Midőn, Uram, haragodban versz minket, / Ottan meghalunk, és földre leesünk, / A te kemény haragodtól rettegünk, / Ha megtekinted mi nagy bűneinket, / Titkos vétkünket ha előhozod, / És színed eleibe állítod.
+              <a:t>7. Taníts meg minket azért kegyelmesen, / Hogy rövid voltát életünknek értsük, / És eszességgel magunkat viseljük! / Ó, Úr Isten, fordulj hozzánk ismétlen! / Míg hagyod, hogy éltünk nyomorogjon? / Könyörülj már a te szolgáidon!
 </a:t>
             </a:r>
           </a:p>
@@ -3290,18 +3290,7 @@
                   <a:srgbClr val="FFFFFF"/>
                 </a:solidFill>
               </a:rPr>
-              <a:t>5. Haragod miatt napja életünknek / Menten elmúlik nagy hirtelenséggel, / Mint a mondott szót elragadja a szél. / Mi napjaink, miket nekünk engedtek, / Mintegy hetvenesztendei idő, / Hogyha több, tehát nyolcvan esztendő.
-</a:t>
-            </a:r>
-          </a:p>
-          <a:p>
-            <a:r>
-              <a:rPr lang="en-US" sz="4000">
-                <a:solidFill>
-                  <a:srgbClr val="FFFFFF"/>
-                </a:solidFill>
-              </a:rPr>
-              <a:t>6. És ha kedves volt is valamennyire, / De többnyire volt munka és fájdalom; / Eltűnik éltünk minden ékessége, / Elmúlik, mint az árnyék és az álom. / De ki érti a te haragodat? / Csak az, ki féli te hatalmadat.
+              <a:t>8. Tölts bé minket reggel nagy irgalmaddal, / Hogy jó kedvvel vigyük véghez éltünket, / Ne terheltessünk nyomorúságokkal! / Vigasztalj minket, és adj könnyebbséget, / És haragodat fordítsd el rólunk, / Mellyel régóta ostoroztatunk!
 </a:t>
             </a:r>
           </a:p>
@@ -3340,8 +3329,8 @@
         </p:nvSpPr>
         <p:spPr>
           <a:xfrm>
-            <a:off x="63500" y="63500"/>
-            <a:ext cx="12065000" cy="6731000"/>
+            <a:off x="0" y="0"/>
+            <a:ext cx="12192000" cy="6858000"/>
           </a:xfrm>
           <a:prstGeom prst="rect">
             <a:avLst/>
@@ -3362,24 +3351,12 @@
           </a:p>
           <a:p>
             <a:r>
-              <a:rPr lang="en-US" sz="4000">
+              <a:rPr lang="en-US" sz="6400">
                 <a:solidFill>
                   <a:srgbClr val="FFFFFF"/>
                 </a:solidFill>
               </a:rPr>
-              <a:t>7. Taníts meg minket azért kegyelmesen, / Hogy rövid voltát életünknek értsük, / És eszességgel magunkat viseljük! / Ó, Úr Isten, fordulj hozzánk ismétlen! / Míg hagyod, hogy éltünk nyomorogjon? / Könyörülj már a te szolgáidon!
-</a:t>
-            </a:r>
-          </a:p>
-          <a:p>
-            <a:r>
-              <a:rPr lang="en-US" sz="4000">
-                <a:solidFill>
-                  <a:srgbClr val="FFFFFF"/>
-                </a:solidFill>
-              </a:rPr>
-              <a:t>8. Tölts bé minket reggel nagy irgalmaddal, / Hogy jó kedvvel vigyük véghez éltünket, / Ne terheltessünk nyomorúságokkal! / Vigasztalj minket, és adj könnyebbséget, / És haragodat fordítsd el rólunk, / Mellyel régóta ostoroztatunk!
-</a:t>
+              <a:t>Lk 2,34</a:t>
             </a:r>
           </a:p>
         </p:txBody>
@@ -3698,7 +3675,7 @@
 </file>
 
 <file path=ppt/slides/slide4.xml><?xml version="1.0" encoding="utf-8"?>
-<p:sld xmlns:p="http://schemas.openxmlformats.org/presentationml/2006/main" xmlns:a="http://schemas.openxmlformats.org/drawingml/2006/main">
+<p:sld xmlns:p="http://schemas.openxmlformats.org/presentationml/2006/main" xmlns:a="http://schemas.openxmlformats.org/drawingml/2006/main" xmlns:r="http://schemas.openxmlformats.org/officeDocument/2006/relationships">
   <p:cSld>
     <p:spTree>
       <p:nvGrpSpPr>
@@ -3714,54 +3691,30 @@
           <a:chExt cx="0" cy="0"/>
         </a:xfrm>
       </p:grpSpPr>
-      <p:sp>
-        <p:nvSpPr>
-          <p:cNvPr name="TextBox 2" id="2"/>
-          <p:cNvSpPr txBox="true"/>
+      <p:pic>
+        <p:nvPicPr>
+          <p:cNvPr name="Picture 2" id="2"/>
+          <p:cNvPicPr>
+            <a:picLocks noChangeAspect="true"/>
+          </p:cNvPicPr>
           <p:nvPr/>
-        </p:nvSpPr>
+        </p:nvPicPr>
+        <p:blipFill>
+          <a:blip r:embed="rId2"/>
+          <a:stretch>
+            <a:fillRect/>
+          </a:stretch>
+        </p:blipFill>
         <p:spPr>
           <a:xfrm>
-            <a:off x="63500" y="63500"/>
-            <a:ext cx="12065000" cy="6731000"/>
+            <a:off x="1016000" y="0"/>
+            <a:ext cx="10160000" cy="13449300"/>
           </a:xfrm>
           <a:prstGeom prst="rect">
             <a:avLst/>
           </a:prstGeom>
         </p:spPr>
-        <p:txBody>
-          <a:bodyPr anchor="t" rtlCol="false"/>
-          <a:lstStyle/>
-          <a:p>
-            <a:pPr algn="l">
-              <a:defRPr/>
-            </a:pPr>
-            <a:r>
-              <a:rPr lang="en"/>
-              <a:t/>
-            </a:r>
-            <a:endParaRPr lang="en-US" sz="1100"/>
-          </a:p>
-          <a:p>
-            <a:r>
-              <a:rPr lang="en-US" sz="4000">
-                <a:solidFill>
-                  <a:srgbClr val="FFFFFF"/>
-                </a:solidFill>
-              </a:rPr>
-              <a:t>1. Hogyha felindul az Isten, / Elkergettetnek szertelen
- Minden ő ellenségi.
- És elfutamodnak széjjel / Ő haragos színe elől
- Minden ő gyűlölői.
- Úgy elűzetnek hirtelen, / Mint a füst semmivé leszen,
- Elvész minden ő dolguk;
- Mint viasz olvad a tűztől, / Úgy az ő kemény színétől
- Elvesznek a gonoszok.
-</a:t>
-            </a:r>
-          </a:p>
-        </p:txBody>
-      </p:sp>
+      </p:pic>
     </p:spTree>
   </p:cSld>
   <p:clrMapOvr>
@@ -3803,7 +3756,7 @@
         </p:blipFill>
         <p:spPr>
           <a:xfrm>
-            <a:off x="1016000" y="0"/>
+            <a:off x="1016000" y="-6591300"/>
             <a:ext cx="10160000" cy="13449300"/>
           </a:xfrm>
           <a:prstGeom prst="rect">
@@ -3811,39 +3764,6 @@
           </a:prstGeom>
         </p:spPr>
       </p:pic>
-      <p:sp>
-        <p:nvSpPr>
-          <p:cNvPr name="TextBox 3" id="3"/>
-          <p:cNvSpPr txBox="true"/>
-          <p:nvPr/>
-        </p:nvSpPr>
-        <p:spPr>
-          <a:xfrm>
-            <a:off x="0" y="0"/>
-            <a:ext cx="952500" cy="635000"/>
-          </a:xfrm>
-          <a:prstGeom prst="rect">
-            <a:avLst/>
-          </a:prstGeom>
-          <a:solidFill>
-            <a:srgbClr val="FF0000"/>
-          </a:solidFill>
-        </p:spPr>
-        <p:txBody>
-          <a:bodyPr anchor="t" rtlCol="false"/>
-          <a:lstStyle/>
-          <a:p>
-            <a:pPr algn="l">
-              <a:defRPr/>
-            </a:pPr>
-            <a:r>
-              <a:rPr lang="en-US"/>
-              <a:t>BAD</a:t>
-            </a:r>
-            <a:endParaRPr lang="en"/>
-          </a:p>
-        </p:txBody>
-      </p:sp>
     </p:spTree>
   </p:cSld>
   <p:clrMapOvr>
@@ -3853,6 +3773,89 @@
 </file>
 
 <file path=ppt/slides/slide6.xml><?xml version="1.0" encoding="utf-8"?>
+<p:sld xmlns:p="http://schemas.openxmlformats.org/presentationml/2006/main" xmlns:a="http://schemas.openxmlformats.org/drawingml/2006/main">
+  <p:cSld>
+    <p:spTree>
+      <p:nvGrpSpPr>
+        <p:cNvPr id="1" name=""/>
+        <p:cNvGrpSpPr/>
+        <p:nvPr/>
+      </p:nvGrpSpPr>
+      <p:grpSpPr>
+        <a:xfrm>
+          <a:off x="0" y="0"/>
+          <a:ext cx="0" cy="0"/>
+          <a:chOff x="0" y="0"/>
+          <a:chExt cx="0" cy="0"/>
+        </a:xfrm>
+      </p:grpSpPr>
+      <p:sp>
+        <p:nvSpPr>
+          <p:cNvPr name="TextBox 2" id="2"/>
+          <p:cNvSpPr txBox="true"/>
+          <p:nvPr/>
+        </p:nvSpPr>
+        <p:spPr>
+          <a:xfrm>
+            <a:off x="63500" y="63500"/>
+            <a:ext cx="12065000" cy="6731000"/>
+          </a:xfrm>
+          <a:prstGeom prst="rect">
+            <a:avLst/>
+          </a:prstGeom>
+        </p:spPr>
+        <p:txBody>
+          <a:bodyPr anchor="t" rtlCol="false"/>
+          <a:lstStyle/>
+          <a:p>
+            <a:pPr algn="l">
+              <a:defRPr/>
+            </a:pPr>
+            <a:r>
+              <a:rPr lang="en"/>
+              <a:t/>
+            </a:r>
+            <a:endParaRPr lang="en-US" sz="1100"/>
+          </a:p>
+          <a:p>
+            <a:r>
+              <a:rPr lang="en-US" sz="4000">
+                <a:solidFill>
+                  <a:srgbClr val="FFFFFF"/>
+                </a:solidFill>
+              </a:rPr>
+              <a:t>2. Könnyhullatásim énnékem / Kenyerem éjjel-nappal,
+ Midőn azt kérdik éntőlem: / Hol Istened, kit vártál?
+ Ezen lelkem kiontom, / És házadat óhajtom,
+ Hol a hívek seregében / Örvendek szép éneklésben.
+</a:t>
+            </a:r>
+          </a:p>
+          <a:p>
+            <a:r>
+              <a:rPr lang="en-US" sz="4000">
+                <a:solidFill>
+                  <a:srgbClr val="FFFFFF"/>
+                </a:solidFill>
+              </a:rPr>
+              <a:t>3. Én lelkem, mire csüggedsz el? / Mit kesergesz ennyire?
+ Bízzál Istenben, nem hágy el, / Kiben örvendek végre,
+ Midőn hozzám orcáját, / Nyújtja szabadítását;
+ Ó, én kegyelmes Istenem, / Mely igen kesereg lelkem!
+</a:t>
+            </a:r>
+          </a:p>
+        </p:txBody>
+      </p:sp>
+    </p:spTree>
+  </p:cSld>
+  <p:clrMapOvr>
+    <a:masterClrMapping/>
+  </p:clrMapOvr>
+</p:sld>
+</file>
+
+<file path=ppt/slides/slide7.xml><?xml version="1.0" encoding="utf-8"?>
 <p:sld xmlns:p="http://schemas.openxmlformats.org/presentationml/2006/main" xmlns:a="http://schemas.openxmlformats.org/drawingml/2006/main" xmlns:r="http://schemas.openxmlformats.org/officeDocument/2006/relationships">
   <p:cSld>
     <p:spTree>
@@ -3885,130 +3888,14 @@
         </p:blipFill>
         <p:spPr>
           <a:xfrm>
-            <a:off x="1016000" y="-6591300"/>
-            <a:ext cx="10160000" cy="13449300"/>
+            <a:off x="1016000" y="0"/>
+            <a:ext cx="10160000" cy="10160000"/>
           </a:xfrm>
           <a:prstGeom prst="rect">
             <a:avLst/>
           </a:prstGeom>
         </p:spPr>
       </p:pic>
-      <p:sp>
-        <p:nvSpPr>
-          <p:cNvPr name="TextBox 3" id="3"/>
-          <p:cNvSpPr txBox="true"/>
-          <p:nvPr/>
-        </p:nvSpPr>
-        <p:spPr>
-          <a:xfrm>
-            <a:off x="0" y="0"/>
-            <a:ext cx="952500" cy="635000"/>
-          </a:xfrm>
-          <a:prstGeom prst="rect">
-            <a:avLst/>
-          </a:prstGeom>
-          <a:solidFill>
-            <a:srgbClr val="FF0000"/>
-          </a:solidFill>
-        </p:spPr>
-        <p:txBody>
-          <a:bodyPr anchor="t" rtlCol="false"/>
-          <a:lstStyle/>
-          <a:p>
-            <a:pPr algn="l">
-              <a:defRPr/>
-            </a:pPr>
-            <a:r>
-              <a:rPr lang="en-US"/>
-              <a:t>BAD</a:t>
-            </a:r>
-            <a:endParaRPr lang="en"/>
-          </a:p>
-        </p:txBody>
-      </p:sp>
-    </p:spTree>
-  </p:cSld>
-  <p:clrMapOvr>
-    <a:masterClrMapping/>
-  </p:clrMapOvr>
-</p:sld>
-</file>
-
-<file path=ppt/slides/slide7.xml><?xml version="1.0" encoding="utf-8"?>
-<p:sld xmlns:p="http://schemas.openxmlformats.org/presentationml/2006/main" xmlns:a="http://schemas.openxmlformats.org/drawingml/2006/main">
-  <p:cSld>
-    <p:spTree>
-      <p:nvGrpSpPr>
-        <p:cNvPr id="1" name=""/>
-        <p:cNvGrpSpPr/>
-        <p:nvPr/>
-      </p:nvGrpSpPr>
-      <p:grpSpPr>
-        <a:xfrm>
-          <a:off x="0" y="0"/>
-          <a:ext cx="0" cy="0"/>
-          <a:chOff x="0" y="0"/>
-          <a:chExt cx="0" cy="0"/>
-        </a:xfrm>
-      </p:grpSpPr>
-      <p:sp>
-        <p:nvSpPr>
-          <p:cNvPr name="TextBox 2" id="2"/>
-          <p:cNvSpPr txBox="true"/>
-          <p:nvPr/>
-        </p:nvSpPr>
-        <p:spPr>
-          <a:xfrm>
-            <a:off x="63500" y="63500"/>
-            <a:ext cx="12065000" cy="6731000"/>
-          </a:xfrm>
-          <a:prstGeom prst="rect">
-            <a:avLst/>
-          </a:prstGeom>
-        </p:spPr>
-        <p:txBody>
-          <a:bodyPr anchor="t" rtlCol="false"/>
-          <a:lstStyle/>
-          <a:p>
-            <a:pPr algn="l">
-              <a:defRPr/>
-            </a:pPr>
-            <a:r>
-              <a:rPr lang="en"/>
-              <a:t/>
-            </a:r>
-            <a:endParaRPr lang="en-US" sz="1100"/>
-          </a:p>
-          <a:p>
-            <a:r>
-              <a:rPr lang="en-US" sz="4000">
-                <a:solidFill>
-                  <a:srgbClr val="FFFFFF"/>
-                </a:solidFill>
-              </a:rPr>
-              <a:t>2. Könnyhullatásim énnékem / Kenyerem éjjel-nappal,
- Midőn azt kérdik éntőlem: / Hol Istened, kit vártál?
- Ezen lelkem kiontom, / És házadat óhajtom,
- Hol a hívek seregében / Örvendek szép éneklésben.
-</a:t>
-            </a:r>
-          </a:p>
-          <a:p>
-            <a:r>
-              <a:rPr lang="en-US" sz="4000">
-                <a:solidFill>
-                  <a:srgbClr val="FFFFFF"/>
-                </a:solidFill>
-              </a:rPr>
-              <a:t>3. Én lelkem, mire csüggedsz el? / Mit kesergesz ennyire?
- Bízzál Istenben, nem hágy el, / Kiben örvendek végre,
- Midőn hozzám orcáját, / Nyújtja szabadítását;
- Ó, én kegyelmes Istenem, / Mely igen kesereg lelkem!
-</a:t>
-            </a:r>
-          </a:p>
-        </p:txBody>
-      </p:sp>
     </p:spTree>
   </p:cSld>
   <p:clrMapOvr>
@@ -4050,7 +3937,7 @@
         </p:blipFill>
         <p:spPr>
           <a:xfrm>
-            <a:off x="1016000" y="0"/>
+            <a:off x="1016000" y="-3302000"/>
             <a:ext cx="10160000" cy="10160000"/>
           </a:xfrm>
           <a:prstGeom prst="rect">
@@ -4058,39 +3945,6 @@
           </a:prstGeom>
         </p:spPr>
       </p:pic>
-      <p:sp>
-        <p:nvSpPr>
-          <p:cNvPr name="TextBox 3" id="3"/>
-          <p:cNvSpPr txBox="true"/>
-          <p:nvPr/>
-        </p:nvSpPr>
-        <p:spPr>
-          <a:xfrm>
-            <a:off x="0" y="0"/>
-            <a:ext cx="952500" cy="635000"/>
-          </a:xfrm>
-          <a:prstGeom prst="rect">
-            <a:avLst/>
-          </a:prstGeom>
-          <a:solidFill>
-            <a:srgbClr val="FF0000"/>
-          </a:solidFill>
-        </p:spPr>
-        <p:txBody>
-          <a:bodyPr anchor="t" rtlCol="false"/>
-          <a:lstStyle/>
-          <a:p>
-            <a:pPr algn="l">
-              <a:defRPr/>
-            </a:pPr>
-            <a:r>
-              <a:rPr lang="en-US"/>
-              <a:t>BAD</a:t>
-            </a:r>
-            <a:endParaRPr lang="en"/>
-          </a:p>
-        </p:txBody>
-      </p:sp>
     </p:spTree>
   </p:cSld>
   <p:clrMapOvr>
@@ -4100,7 +3954,7 @@
 </file>
 
 <file path=ppt/slides/slide9.xml><?xml version="1.0" encoding="utf-8"?>
-<p:sld xmlns:p="http://schemas.openxmlformats.org/presentationml/2006/main" xmlns:a="http://schemas.openxmlformats.org/drawingml/2006/main" xmlns:r="http://schemas.openxmlformats.org/officeDocument/2006/relationships">
+<p:sld xmlns:p="http://schemas.openxmlformats.org/presentationml/2006/main" xmlns:a="http://schemas.openxmlformats.org/drawingml/2006/main">
   <p:cSld>
     <p:spTree>
       <p:nvGrpSpPr>
@@ -4116,48 +3970,21 @@
           <a:chExt cx="0" cy="0"/>
         </a:xfrm>
       </p:grpSpPr>
-      <p:pic>
-        <p:nvPicPr>
-          <p:cNvPr name="Picture 2" id="2"/>
-          <p:cNvPicPr>
-            <a:picLocks noChangeAspect="true"/>
-          </p:cNvPicPr>
+      <p:sp>
+        <p:nvSpPr>
+          <p:cNvPr name="TextBox 2" id="2"/>
+          <p:cNvSpPr txBox="true"/>
           <p:nvPr/>
-        </p:nvPicPr>
-        <p:blipFill>
-          <a:blip r:embed="rId2"/>
-          <a:stretch>
-            <a:fillRect/>
-          </a:stretch>
-        </p:blipFill>
+        </p:nvSpPr>
         <p:spPr>
           <a:xfrm>
-            <a:off x="1016000" y="-3302000"/>
-            <a:ext cx="10160000" cy="10160000"/>
+            <a:off x="63500" y="63500"/>
+            <a:ext cx="12065000" cy="6731000"/>
           </a:xfrm>
           <a:prstGeom prst="rect">
             <a:avLst/>
           </a:prstGeom>
         </p:spPr>
-      </p:pic>
-      <p:sp>
-        <p:nvSpPr>
-          <p:cNvPr name="TextBox 3" id="3"/>
-          <p:cNvSpPr txBox="true"/>
-          <p:nvPr/>
-        </p:nvSpPr>
-        <p:spPr>
-          <a:xfrm>
-            <a:off x="0" y="0"/>
-            <a:ext cx="952500" cy="635000"/>
-          </a:xfrm>
-          <a:prstGeom prst="rect">
-            <a:avLst/>
-          </a:prstGeom>
-          <a:solidFill>
-            <a:srgbClr val="FF0000"/>
-          </a:solidFill>
-        </p:spPr>
         <p:txBody>
           <a:bodyPr anchor="t" rtlCol="false"/>
           <a:lstStyle/>
@@ -4166,10 +3993,32 @@
               <a:defRPr/>
             </a:pPr>
             <a:r>
-              <a:rPr lang="en-US"/>
-              <a:t>BAD</a:t>
-            </a:r>
-            <a:endParaRPr lang="en"/>
+              <a:rPr lang="en"/>
+              <a:t/>
+            </a:r>
+            <a:endParaRPr lang="en-US" sz="1100"/>
+          </a:p>
+          <a:p>
+            <a:r>
+              <a:rPr lang="en-US" sz="4000">
+                <a:solidFill>
+                  <a:srgbClr val="FFFFFF"/>
+                </a:solidFill>
+              </a:rPr>
+              <a:t>2. Az embereket te meg hagyod halni, / És ezt mondod az emberi nemzetnek: / Légyetek porrá, kik porból lettetek! / Mert ezer esztendő előtted annyi, / Mint a tegnapnak ő elmúlása / És egy éjnek rövid vigyázása.
+</a:t>
+            </a:r>
+          </a:p>
+          <a:p>
+            <a:r>
+              <a:rPr lang="en-US" sz="4000">
+                <a:solidFill>
+                  <a:srgbClr val="FFFFFF"/>
+                </a:solidFill>
+              </a:rPr>
+              <a:t>3. Elmúlni hagyod őket oly hirtelen, / Mint az álom, mely eltűnik azontól, / Mihelyt az ember felserken álmából, / És mint a zöld füvecske a mezőben, / Amely nagy hamarsággal elhervad, / Reggel virágzik, este megszárad.
+</a:t>
+            </a:r>
           </a:p>
         </p:txBody>
       </p:sp>

</xml_diff>